<commit_message>
Report and presentation added Impact section
</commit_message>
<xml_diff>
--- a/User Trust and Malicious Voting.pptx
+++ b/User Trust and Malicious Voting.pptx
@@ -8,14 +8,16 @@
     <p:sldId id="256" r:id="rId2"/>
     <p:sldId id="257" r:id="rId3"/>
     <p:sldId id="258" r:id="rId4"/>
-    <p:sldId id="259" r:id="rId5"/>
-    <p:sldId id="262" r:id="rId6"/>
-    <p:sldId id="260" r:id="rId7"/>
-    <p:sldId id="261" r:id="rId8"/>
-    <p:sldId id="263" r:id="rId9"/>
-    <p:sldId id="264" r:id="rId10"/>
-    <p:sldId id="265" r:id="rId11"/>
-    <p:sldId id="267" r:id="rId12"/>
+    <p:sldId id="268" r:id="rId5"/>
+    <p:sldId id="259" r:id="rId6"/>
+    <p:sldId id="262" r:id="rId7"/>
+    <p:sldId id="260" r:id="rId8"/>
+    <p:sldId id="261" r:id="rId9"/>
+    <p:sldId id="263" r:id="rId10"/>
+    <p:sldId id="264" r:id="rId11"/>
+    <p:sldId id="269" r:id="rId12"/>
+    <p:sldId id="265" r:id="rId13"/>
+    <p:sldId id="267" r:id="rId14"/>
   </p:sldIdLst>
   <p:sldSz cx="12192000" cy="6858000"/>
   <p:notesSz cx="6858000" cy="9144000"/>
@@ -114,6 +116,11 @@
       </a:defRPr>
     </a:lvl9pPr>
   </p:defaultTextStyle>
+  <p:extLst>
+    <p:ext uri="{EFAFB233-063F-42B5-8137-9DF3F51BA10A}">
+      <p15:sldGuideLst xmlns:p15="http://schemas.microsoft.com/office/powerpoint/2012/main"/>
+    </p:ext>
+  </p:extLst>
 </p:presentation>
 </file>
 
@@ -2656,7 +2663,7 @@
             <a:fld id="{5923F103-BC34-4FE4-A40E-EDDEECFDA5D0}" type="datetimeFigureOut">
               <a:rPr lang="en-US" smtClean="0"/>
               <a:pPr/>
-              <a:t>4/20/19</a:t>
+              <a:t>4/23/19</a:t>
             </a:fld>
             <a:endParaRPr lang="en-US" dirty="0"/>
           </a:p>
@@ -2932,7 +2939,7 @@
           <a:p>
             <a:fld id="{923A1CC3-2375-41D4-9E03-427CAF2A4C1A}" type="datetimeFigureOut">
               <a:rPr lang="en-US" smtClean="0"/>
-              <a:t>4/20/19</a:t>
+              <a:t>4/23/19</a:t>
             </a:fld>
             <a:endParaRPr lang="en-US" dirty="0"/>
           </a:p>
@@ -3127,7 +3134,7 @@
           <a:p>
             <a:fld id="{AFF16868-8199-4C2C-A5B1-63AEE139F88E}" type="datetimeFigureOut">
               <a:rPr lang="en-US" smtClean="0"/>
-              <a:t>4/20/19</a:t>
+              <a:t>4/23/19</a:t>
             </a:fld>
             <a:endParaRPr lang="en-US" dirty="0"/>
           </a:p>
@@ -3396,7 +3403,7 @@
           <a:p>
             <a:fld id="{2BE451C3-0FF4-47C4-B829-773ADF60F88C}" type="datetimeFigureOut">
               <a:rPr lang="en-US" smtClean="0"/>
-              <a:t>4/20/19</a:t>
+              <a:t>4/23/19</a:t>
             </a:fld>
             <a:endParaRPr lang="en-US" dirty="0"/>
           </a:p>
@@ -3730,7 +3737,7 @@
           <a:p>
             <a:fld id="{5C12C299-16B2-4475-990D-751901EACC14}" type="datetimeFigureOut">
               <a:rPr lang="en-US" smtClean="0"/>
-              <a:t>4/20/19</a:t>
+              <a:t>4/23/19</a:t>
             </a:fld>
             <a:endParaRPr lang="en-US" dirty="0"/>
           </a:p>
@@ -4341,7 +4348,7 @@
           <a:p>
             <a:fld id="{9FE86839-B9D8-4651-8783-F325ECE74E65}" type="datetimeFigureOut">
               <a:rPr lang="en-US" smtClean="0"/>
-              <a:t>4/20/19</a:t>
+              <a:t>4/23/19</a:t>
             </a:fld>
             <a:endParaRPr lang="en-US" dirty="0"/>
           </a:p>
@@ -5189,7 +5196,7 @@
           <a:p>
             <a:fld id="{FD484F64-32F6-45C5-931F-ADC1662401D0}" type="datetimeFigureOut">
               <a:rPr lang="en-US" smtClean="0"/>
-              <a:t>4/20/19</a:t>
+              <a:t>4/23/19</a:t>
             </a:fld>
             <a:endParaRPr lang="en-US" dirty="0"/>
           </a:p>
@@ -5360,7 +5367,7 @@
           <a:p>
             <a:fld id="{53086D93-FCAC-47E0-A2EE-787E62CA814C}" type="datetimeFigureOut">
               <a:rPr lang="en-US" smtClean="0"/>
-              <a:t>4/20/19</a:t>
+              <a:t>4/23/19</a:t>
             </a:fld>
             <a:endParaRPr lang="en-US" dirty="0"/>
           </a:p>
@@ -5541,7 +5548,7 @@
           <a:p>
             <a:fld id="{CDA879A6-0FD0-4734-A311-86BFCA472E6E}" type="datetimeFigureOut">
               <a:rPr lang="en-US" smtClean="0"/>
-              <a:t>4/20/19</a:t>
+              <a:t>4/23/19</a:t>
             </a:fld>
             <a:endParaRPr lang="en-US" dirty="0"/>
           </a:p>
@@ -5712,7 +5719,7 @@
           <a:p>
             <a:fld id="{19C9CA7B-DFD4-44B5-8C60-D14B8CD1FB59}" type="datetimeFigureOut">
               <a:rPr lang="en-US" smtClean="0"/>
-              <a:t>4/20/19</a:t>
+              <a:t>4/23/19</a:t>
             </a:fld>
             <a:endParaRPr lang="en-US" dirty="0"/>
           </a:p>
@@ -5957,7 +5964,7 @@
           <a:p>
             <a:fld id="{F34E6425-0181-43F2-84FC-787E803FD2F8}" type="datetimeFigureOut">
               <a:rPr lang="en-US" smtClean="0"/>
-              <a:t>4/20/19</a:t>
+              <a:t>4/23/19</a:t>
             </a:fld>
             <a:endParaRPr lang="en-US" dirty="0"/>
           </a:p>
@@ -6250,7 +6257,7 @@
           <a:p>
             <a:fld id="{3BDB8791-F1B0-41E7-B7FD-A781E65C4266}" type="datetimeFigureOut">
               <a:rPr lang="en-US" smtClean="0"/>
-              <a:t>4/20/19</a:t>
+              <a:t>4/23/19</a:t>
             </a:fld>
             <a:endParaRPr lang="en-US" dirty="0"/>
           </a:p>
@@ -6689,7 +6696,7 @@
           <a:p>
             <a:fld id="{5FDD63B2-E120-4ED8-B27B-C685F510A5FE}" type="datetimeFigureOut">
               <a:rPr lang="en-US" smtClean="0"/>
-              <a:t>4/20/19</a:t>
+              <a:t>4/23/19</a:t>
             </a:fld>
             <a:endParaRPr lang="en-US" dirty="0"/>
           </a:p>
@@ -6808,7 +6815,7 @@
           <a:p>
             <a:fld id="{7AA18ACC-A947-437B-A130-35BD54FDF1E9}" type="datetimeFigureOut">
               <a:rPr lang="en-US" smtClean="0"/>
-              <a:t>4/20/19</a:t>
+              <a:t>4/23/19</a:t>
             </a:fld>
             <a:endParaRPr lang="en-US" dirty="0"/>
           </a:p>
@@ -6904,7 +6911,7 @@
           <a:p>
             <a:fld id="{7C8D7E02-BCB8-4D50-A234-369438C08659}" type="datetimeFigureOut">
               <a:rPr lang="en-US" smtClean="0"/>
-              <a:t>4/20/19</a:t>
+              <a:t>4/23/19</a:t>
             </a:fld>
             <a:endParaRPr lang="en-US" dirty="0"/>
           </a:p>
@@ -7184,7 +7191,7 @@
           <a:p>
             <a:fld id="{76E86A4C-8E40-4F87-A4F0-01A0687C5742}" type="datetimeFigureOut">
               <a:rPr lang="en-US" smtClean="0"/>
-              <a:t>4/20/19</a:t>
+              <a:t>4/23/19</a:t>
             </a:fld>
             <a:endParaRPr lang="en-US" dirty="0"/>
           </a:p>
@@ -7460,7 +7467,7 @@
           <a:p>
             <a:fld id="{35E72C73-2D91-4E12-BA25-F0AA0C03599B}" type="datetimeFigureOut">
               <a:rPr lang="en-US" smtClean="0"/>
-              <a:t>4/20/19</a:t>
+              <a:t>4/23/19</a:t>
             </a:fld>
             <a:endParaRPr lang="en-US" dirty="0"/>
           </a:p>
@@ -7890,7 +7897,7 @@
           <a:p>
             <a:fld id="{2BE451C3-0FF4-47C4-B829-773ADF60F88C}" type="datetimeFigureOut">
               <a:rPr lang="en-US" smtClean="0"/>
-              <a:t>4/20/19</a:t>
+              <a:t>4/23/19</a:t>
             </a:fld>
             <a:endParaRPr lang="en-US" dirty="0"/>
           </a:p>
@@ -8494,6 +8501,218 @@
           <p:cNvPr id="2" name="Title 1">
             <a:extLst>
               <a:ext uri="{FF2B5EF4-FFF2-40B4-BE49-F238E27FC236}">
+                <a16:creationId xmlns:a16="http://schemas.microsoft.com/office/drawing/2014/main" id="{7D4DC21B-6A3C-7442-ACC2-588D5D15677B}"/>
+              </a:ext>
+            </a:extLst>
+          </p:cNvPr>
+          <p:cNvSpPr>
+            <a:spLocks noGrp="1"/>
+          </p:cNvSpPr>
+          <p:nvPr>
+            <p:ph type="title"/>
+          </p:nvPr>
+        </p:nvSpPr>
+        <p:spPr/>
+        <p:txBody>
+          <a:bodyPr/>
+          <a:lstStyle/>
+          <a:p>
+            <a:r>
+              <a:rPr lang="en-US" dirty="0"/>
+              <a:t>Simulation on top %1.6 business</a:t>
+            </a:r>
+          </a:p>
+        </p:txBody>
+      </p:sp>
+      <p:graphicFrame>
+        <p:nvGraphicFramePr>
+          <p:cNvPr id="10" name="Content Placeholder 9">
+            <a:extLst>
+              <a:ext uri="{FF2B5EF4-FFF2-40B4-BE49-F238E27FC236}">
+                <a16:creationId xmlns:a16="http://schemas.microsoft.com/office/drawing/2014/main" id="{1D46E59F-E1CD-4095-93E7-522D18CC97A1}"/>
+              </a:ext>
+            </a:extLst>
+          </p:cNvPr>
+          <p:cNvGraphicFramePr>
+            <a:graphicFrameLocks noGrp="1"/>
+          </p:cNvGraphicFramePr>
+          <p:nvPr>
+            <p:ph idx="1"/>
+            <p:extLst>
+              <p:ext uri="{D42A27DB-BD31-4B8C-83A1-F6EECF244321}">
+                <p14:modId xmlns:p14="http://schemas.microsoft.com/office/powerpoint/2010/main" val="1539996356"/>
+              </p:ext>
+            </p:extLst>
+          </p:nvPr>
+        </p:nvGraphicFramePr>
+        <p:xfrm>
+          <a:off x="645740" y="1853248"/>
+          <a:ext cx="9404723" cy="4395152"/>
+        </p:xfrm>
+        <a:graphic>
+          <a:graphicData uri="http://schemas.openxmlformats.org/drawingml/2006/chart">
+            <c:chart xmlns:c="http://schemas.openxmlformats.org/drawingml/2006/chart" xmlns:r="http://schemas.openxmlformats.org/officeDocument/2006/relationships" r:id="rId2"/>
+          </a:graphicData>
+        </a:graphic>
+      </p:graphicFrame>
+    </p:spTree>
+    <p:extLst>
+      <p:ext uri="{BB962C8B-B14F-4D97-AF65-F5344CB8AC3E}">
+        <p14:creationId xmlns:p14="http://schemas.microsoft.com/office/powerpoint/2010/main" val="58319026"/>
+      </p:ext>
+    </p:extLst>
+  </p:cSld>
+  <p:clrMapOvr>
+    <a:masterClrMapping/>
+  </p:clrMapOvr>
+</p:sld>
+</file>
+
+<file path=ppt/slides/slide11.xml><?xml version="1.0" encoding="utf-8"?>
+<p:sld xmlns:a="http://schemas.openxmlformats.org/drawingml/2006/main" xmlns:r="http://schemas.openxmlformats.org/officeDocument/2006/relationships" xmlns:p="http://schemas.openxmlformats.org/presentationml/2006/main">
+  <p:cSld>
+    <p:spTree>
+      <p:nvGrpSpPr>
+        <p:cNvPr id="1" name=""/>
+        <p:cNvGrpSpPr/>
+        <p:nvPr/>
+      </p:nvGrpSpPr>
+      <p:grpSpPr>
+        <a:xfrm>
+          <a:off x="0" y="0"/>
+          <a:ext cx="0" cy="0"/>
+          <a:chOff x="0" y="0"/>
+          <a:chExt cx="0" cy="0"/>
+        </a:xfrm>
+      </p:grpSpPr>
+      <p:sp>
+        <p:nvSpPr>
+          <p:cNvPr id="2" name="Title 1">
+            <a:extLst>
+              <a:ext uri="{FF2B5EF4-FFF2-40B4-BE49-F238E27FC236}">
+                <a16:creationId xmlns:a16="http://schemas.microsoft.com/office/drawing/2014/main" id="{8EC40996-62A2-1342-9DA9-8005D89B73C8}"/>
+              </a:ext>
+            </a:extLst>
+          </p:cNvPr>
+          <p:cNvSpPr>
+            <a:spLocks noGrp="1"/>
+          </p:cNvSpPr>
+          <p:nvPr>
+            <p:ph type="title"/>
+          </p:nvPr>
+        </p:nvSpPr>
+        <p:spPr/>
+        <p:txBody>
+          <a:bodyPr/>
+          <a:lstStyle/>
+          <a:p>
+            <a:r>
+              <a:rPr lang="en-US" dirty="0"/>
+              <a:t>Impact of </a:t>
+            </a:r>
+            <a:r>
+              <a:rPr lang="en-US" dirty="0" err="1"/>
+              <a:t>RepTrap</a:t>
+            </a:r>
+            <a:endParaRPr lang="en-US" dirty="0"/>
+          </a:p>
+        </p:txBody>
+      </p:sp>
+      <p:sp>
+        <p:nvSpPr>
+          <p:cNvPr id="3" name="Content Placeholder 2">
+            <a:extLst>
+              <a:ext uri="{FF2B5EF4-FFF2-40B4-BE49-F238E27FC236}">
+                <a16:creationId xmlns:a16="http://schemas.microsoft.com/office/drawing/2014/main" id="{2383647C-884E-2F4C-B8D7-B830EDD562C9}"/>
+              </a:ext>
+            </a:extLst>
+          </p:cNvPr>
+          <p:cNvSpPr>
+            <a:spLocks noGrp="1"/>
+          </p:cNvSpPr>
+          <p:nvPr>
+            <p:ph idx="1"/>
+          </p:nvPr>
+        </p:nvSpPr>
+        <p:spPr/>
+        <p:txBody>
+          <a:bodyPr>
+            <a:normAutofit/>
+          </a:bodyPr>
+          <a:lstStyle/>
+          <a:p>
+            <a:r>
+              <a:rPr lang="en-US" sz="2400" dirty="0"/>
+              <a:t>Malicious users can flip business’ star ratings</a:t>
+            </a:r>
+          </a:p>
+          <a:p>
+            <a:endParaRPr lang="en-US" sz="2400" dirty="0"/>
+          </a:p>
+          <a:p>
+            <a:r>
+              <a:rPr lang="en-US" sz="2400" dirty="0"/>
+              <a:t>Small group of 34 to 180 can change nearly any business</a:t>
+            </a:r>
+          </a:p>
+          <a:p>
+            <a:pPr lvl="1"/>
+            <a:r>
+              <a:rPr lang="en-US" sz="2200" dirty="0"/>
+              <a:t>Up to top %1.6 </a:t>
+            </a:r>
+            <a:r>
+              <a:rPr lang="en-US" sz="2200"/>
+              <a:t>of businesses</a:t>
+            </a:r>
+            <a:endParaRPr lang="en-US" sz="2200" dirty="0"/>
+          </a:p>
+          <a:p>
+            <a:endParaRPr lang="en-US" sz="2400" dirty="0"/>
+          </a:p>
+          <a:p>
+            <a:r>
+              <a:rPr lang="en-US" sz="2400" dirty="0"/>
+              <a:t>Changed data will be viewed by all users of the system</a:t>
+            </a:r>
+          </a:p>
+        </p:txBody>
+      </p:sp>
+    </p:spTree>
+    <p:extLst>
+      <p:ext uri="{BB962C8B-B14F-4D97-AF65-F5344CB8AC3E}">
+        <p14:creationId xmlns:p14="http://schemas.microsoft.com/office/powerpoint/2010/main" val="3410953924"/>
+      </p:ext>
+    </p:extLst>
+  </p:cSld>
+  <p:clrMapOvr>
+    <a:masterClrMapping/>
+  </p:clrMapOvr>
+</p:sld>
+</file>
+
+<file path=ppt/slides/slide12.xml><?xml version="1.0" encoding="utf-8"?>
+<p:sld xmlns:a="http://schemas.openxmlformats.org/drawingml/2006/main" xmlns:r="http://schemas.openxmlformats.org/officeDocument/2006/relationships" xmlns:p="http://schemas.openxmlformats.org/presentationml/2006/main">
+  <p:cSld>
+    <p:spTree>
+      <p:nvGrpSpPr>
+        <p:cNvPr id="1" name=""/>
+        <p:cNvGrpSpPr/>
+        <p:nvPr/>
+      </p:nvGrpSpPr>
+      <p:grpSpPr>
+        <a:xfrm>
+          <a:off x="0" y="0"/>
+          <a:ext cx="0" cy="0"/>
+          <a:chOff x="0" y="0"/>
+          <a:chExt cx="0" cy="0"/>
+        </a:xfrm>
+      </p:grpSpPr>
+      <p:sp>
+        <p:nvSpPr>
+          <p:cNvPr id="2" name="Title 1">
+            <a:extLst>
+              <a:ext uri="{FF2B5EF4-FFF2-40B4-BE49-F238E27FC236}">
                 <a16:creationId xmlns:a16="http://schemas.microsoft.com/office/drawing/2014/main" id="{6A0D29ED-30C6-004E-8B50-28EC75A1EB20}"/>
               </a:ext>
             </a:extLst>
@@ -8533,10 +8752,15 @@
             <p:ph idx="1"/>
           </p:nvPr>
         </p:nvSpPr>
-        <p:spPr/>
+        <p:spPr>
+          <a:xfrm>
+            <a:off x="1103312" y="1260390"/>
+            <a:ext cx="8946541" cy="4988010"/>
+          </a:xfrm>
+        </p:spPr>
         <p:txBody>
           <a:bodyPr>
-            <a:normAutofit/>
+            <a:normAutofit fontScale="92500" lnSpcReduction="10000"/>
           </a:bodyPr>
           <a:lstStyle/>
           <a:p>
@@ -8599,8 +8823,33 @@
           <a:p>
             <a:pPr lvl="1"/>
             <a:r>
+              <a:rPr lang="en-US" sz="2400" dirty="0"/>
+              <a:t>Trapping good and bad businesses</a:t>
+            </a:r>
+            <a:endParaRPr lang="en-US" sz="2200" dirty="0"/>
+          </a:p>
+          <a:p>
+            <a:pPr lvl="1"/>
+            <a:r>
               <a:rPr lang="en-US" sz="2000" dirty="0"/>
               <a:t>Calculate theoretical honest votes and compare with trap votes</a:t>
+            </a:r>
+          </a:p>
+          <a:p>
+            <a:endParaRPr lang="en-US" sz="2200" dirty="0"/>
+          </a:p>
+          <a:p>
+            <a:r>
+              <a:rPr lang="en-US" sz="2200" dirty="0"/>
+              <a:t>Large assumption by </a:t>
+            </a:r>
+            <a:r>
+              <a:rPr lang="en-US" sz="2200" dirty="0" err="1"/>
+              <a:t>RepTrap</a:t>
+            </a:r>
+            <a:r>
+              <a:rPr lang="en-US" sz="2200" dirty="0"/>
+              <a:t> with access to voting records</a:t>
             </a:r>
           </a:p>
         </p:txBody>
@@ -8618,7 +8867,7 @@
 </p:sld>
 </file>
 
-<file path=ppt/slides/slide11.xml><?xml version="1.0" encoding="utf-8"?>
+<file path=ppt/slides/slide13.xml><?xml version="1.0" encoding="utf-8"?>
 <p:sld xmlns:a="http://schemas.openxmlformats.org/drawingml/2006/main" xmlns:r="http://schemas.openxmlformats.org/officeDocument/2006/relationships" xmlns:p="http://schemas.openxmlformats.org/presentationml/2006/main">
   <p:cSld>
     <p:spTree>
@@ -8973,7 +9222,7 @@
           <p:cNvPr id="2" name="Title 1">
             <a:extLst>
               <a:ext uri="{FF2B5EF4-FFF2-40B4-BE49-F238E27FC236}">
-                <a16:creationId xmlns:a16="http://schemas.microsoft.com/office/drawing/2014/main" id="{63D9B066-9C23-9C4A-BFD7-B4808FD33515}"/>
+                <a16:creationId xmlns:a16="http://schemas.microsoft.com/office/drawing/2014/main" id="{32BF3559-FB5C-D14D-8159-007271A5B172}"/>
               </a:ext>
             </a:extLst>
           </p:cNvPr>
@@ -8990,91 +9239,636 @@
           <a:lstStyle/>
           <a:p>
             <a:r>
-              <a:rPr lang="en-US" dirty="0" err="1"/>
-              <a:t>RepTrap</a:t>
-            </a:r>
-            <a:endParaRPr lang="en-US" dirty="0"/>
-          </a:p>
-        </p:txBody>
-      </p:sp>
-      <p:sp>
-        <p:nvSpPr>
-          <p:cNvPr id="3" name="Content Placeholder 2">
+              <a:rPr lang="en-US" dirty="0"/>
+              <a:t>Malicious Voting</a:t>
+            </a:r>
+          </a:p>
+        </p:txBody>
+      </p:sp>
+      <p:sp>
+        <p:nvSpPr>
+          <p:cNvPr id="4" name="Rectangle 3">
             <a:extLst>
               <a:ext uri="{FF2B5EF4-FFF2-40B4-BE49-F238E27FC236}">
-                <a16:creationId xmlns:a16="http://schemas.microsoft.com/office/drawing/2014/main" id="{9C1A04B2-7343-4043-B1C5-10A1A9FECB1E}"/>
+                <a16:creationId xmlns:a16="http://schemas.microsoft.com/office/drawing/2014/main" id="{BE71E33E-3CC9-CD40-AF65-56262C922810}"/>
               </a:ext>
             </a:extLst>
           </p:cNvPr>
-          <p:cNvSpPr>
-            <a:spLocks noGrp="1"/>
-          </p:cNvSpPr>
-          <p:nvPr>
-            <p:ph idx="1"/>
-          </p:nvPr>
-        </p:nvSpPr>
-        <p:spPr/>
-        <p:txBody>
-          <a:bodyPr>
-            <a:normAutofit fontScale="92500" lnSpcReduction="20000"/>
+          <p:cNvSpPr/>
+          <p:nvPr/>
+        </p:nvSpPr>
+        <p:spPr>
+          <a:xfrm>
+            <a:off x="1297459" y="3583459"/>
+            <a:ext cx="852617" cy="1742303"/>
+          </a:xfrm>
+          <a:prstGeom prst="rect">
+            <a:avLst/>
+          </a:prstGeom>
+          <a:solidFill>
+            <a:srgbClr val="FF0000"/>
+          </a:solidFill>
+        </p:spPr>
+        <p:style>
+          <a:lnRef idx="2">
+            <a:schemeClr val="accent1">
+              <a:shade val="50000"/>
+            </a:schemeClr>
+          </a:lnRef>
+          <a:fillRef idx="1">
+            <a:schemeClr val="accent1"/>
+          </a:fillRef>
+          <a:effectRef idx="0">
+            <a:schemeClr val="accent1"/>
+          </a:effectRef>
+          <a:fontRef idx="minor">
+            <a:schemeClr val="lt1"/>
+          </a:fontRef>
+        </p:style>
+        <p:txBody>
+          <a:bodyPr rtlCol="0" anchor="ctr"/>
+          <a:lstStyle/>
+          <a:p>
+            <a:pPr algn="ctr"/>
+            <a:endParaRPr lang="en-US"/>
+          </a:p>
+        </p:txBody>
+      </p:sp>
+      <p:sp>
+        <p:nvSpPr>
+          <p:cNvPr id="5" name="Rectangle 4">
+            <a:extLst>
+              <a:ext uri="{FF2B5EF4-FFF2-40B4-BE49-F238E27FC236}">
+                <a16:creationId xmlns:a16="http://schemas.microsoft.com/office/drawing/2014/main" id="{4A66FCF2-E10C-844A-9458-BF308E359F24}"/>
+              </a:ext>
+            </a:extLst>
+          </p:cNvPr>
+          <p:cNvSpPr/>
+          <p:nvPr/>
+        </p:nvSpPr>
+        <p:spPr>
+          <a:xfrm>
+            <a:off x="2344223" y="2866769"/>
+            <a:ext cx="852617" cy="2458994"/>
+          </a:xfrm>
+          <a:prstGeom prst="rect">
+            <a:avLst/>
+          </a:prstGeom>
+          <a:solidFill>
+            <a:schemeClr val="bg2">
+              <a:lumMod val="20000"/>
+              <a:lumOff val="80000"/>
+            </a:schemeClr>
+          </a:solidFill>
+        </p:spPr>
+        <p:style>
+          <a:lnRef idx="2">
+            <a:schemeClr val="accent1">
+              <a:shade val="50000"/>
+            </a:schemeClr>
+          </a:lnRef>
+          <a:fillRef idx="1">
+            <a:schemeClr val="accent1"/>
+          </a:fillRef>
+          <a:effectRef idx="0">
+            <a:schemeClr val="accent1"/>
+          </a:effectRef>
+          <a:fontRef idx="minor">
+            <a:schemeClr val="lt1"/>
+          </a:fontRef>
+        </p:style>
+        <p:txBody>
+          <a:bodyPr rtlCol="0" anchor="ctr"/>
+          <a:lstStyle/>
+          <a:p>
+            <a:pPr algn="ctr"/>
+            <a:endParaRPr lang="en-US"/>
+          </a:p>
+        </p:txBody>
+      </p:sp>
+      <p:sp>
+        <p:nvSpPr>
+          <p:cNvPr id="6" name="Rectangle 5">
+            <a:extLst>
+              <a:ext uri="{FF2B5EF4-FFF2-40B4-BE49-F238E27FC236}">
+                <a16:creationId xmlns:a16="http://schemas.microsoft.com/office/drawing/2014/main" id="{1FC90280-BBA1-1041-82C6-38445B581D37}"/>
+              </a:ext>
+            </a:extLst>
+          </p:cNvPr>
+          <p:cNvSpPr/>
+          <p:nvPr/>
+        </p:nvSpPr>
+        <p:spPr>
+          <a:xfrm>
+            <a:off x="7208762" y="3583459"/>
+            <a:ext cx="852617" cy="1742303"/>
+          </a:xfrm>
+          <a:prstGeom prst="rect">
+            <a:avLst/>
+          </a:prstGeom>
+          <a:solidFill>
+            <a:srgbClr val="FF0000"/>
+          </a:solidFill>
+        </p:spPr>
+        <p:style>
+          <a:lnRef idx="2">
+            <a:schemeClr val="accent1">
+              <a:shade val="50000"/>
+            </a:schemeClr>
+          </a:lnRef>
+          <a:fillRef idx="1">
+            <a:schemeClr val="accent1"/>
+          </a:fillRef>
+          <a:effectRef idx="0">
+            <a:schemeClr val="accent1"/>
+          </a:effectRef>
+          <a:fontRef idx="minor">
+            <a:schemeClr val="lt1"/>
+          </a:fontRef>
+        </p:style>
+        <p:txBody>
+          <a:bodyPr rtlCol="0" anchor="ctr"/>
+          <a:lstStyle/>
+          <a:p>
+            <a:pPr algn="ctr"/>
+            <a:endParaRPr lang="en-US"/>
+          </a:p>
+        </p:txBody>
+      </p:sp>
+      <p:sp>
+        <p:nvSpPr>
+          <p:cNvPr id="7" name="Rectangle 6">
+            <a:extLst>
+              <a:ext uri="{FF2B5EF4-FFF2-40B4-BE49-F238E27FC236}">
+                <a16:creationId xmlns:a16="http://schemas.microsoft.com/office/drawing/2014/main" id="{DF48BA30-D22D-7848-A9F8-E51B6A81C2E5}"/>
+              </a:ext>
+            </a:extLst>
+          </p:cNvPr>
+          <p:cNvSpPr/>
+          <p:nvPr/>
+        </p:nvSpPr>
+        <p:spPr>
+          <a:xfrm>
+            <a:off x="8200332" y="2866769"/>
+            <a:ext cx="852617" cy="2458994"/>
+          </a:xfrm>
+          <a:prstGeom prst="rect">
+            <a:avLst/>
+          </a:prstGeom>
+          <a:solidFill>
+            <a:schemeClr val="bg2">
+              <a:lumMod val="20000"/>
+              <a:lumOff val="80000"/>
+            </a:schemeClr>
+          </a:solidFill>
+        </p:spPr>
+        <p:style>
+          <a:lnRef idx="2">
+            <a:schemeClr val="accent1">
+              <a:shade val="50000"/>
+            </a:schemeClr>
+          </a:lnRef>
+          <a:fillRef idx="1">
+            <a:schemeClr val="accent1"/>
+          </a:fillRef>
+          <a:effectRef idx="0">
+            <a:schemeClr val="accent1"/>
+          </a:effectRef>
+          <a:fontRef idx="minor">
+            <a:schemeClr val="lt1"/>
+          </a:fontRef>
+        </p:style>
+        <p:txBody>
+          <a:bodyPr rtlCol="0" anchor="ctr"/>
+          <a:lstStyle/>
+          <a:p>
+            <a:pPr algn="ctr"/>
+            <a:endParaRPr lang="en-US"/>
+          </a:p>
+        </p:txBody>
+      </p:sp>
+      <p:cxnSp>
+        <p:nvCxnSpPr>
+          <p:cNvPr id="9" name="Straight Arrow Connector 8">
+            <a:extLst>
+              <a:ext uri="{FF2B5EF4-FFF2-40B4-BE49-F238E27FC236}">
+                <a16:creationId xmlns:a16="http://schemas.microsoft.com/office/drawing/2014/main" id="{1B38765F-4222-B644-B4E7-8375463B948F}"/>
+              </a:ext>
+            </a:extLst>
+          </p:cNvPr>
+          <p:cNvCxnSpPr/>
+          <p:nvPr/>
+        </p:nvCxnSpPr>
+        <p:spPr>
+          <a:xfrm flipV="1">
+            <a:off x="646111" y="4285129"/>
+            <a:ext cx="0" cy="1040633"/>
+          </a:xfrm>
+          <a:prstGeom prst="straightConnector1">
+            <a:avLst/>
+          </a:prstGeom>
+          <a:ln w="79375">
+            <a:solidFill>
+              <a:schemeClr val="bg1"/>
+            </a:solidFill>
+            <a:tailEnd type="triangle"/>
+          </a:ln>
+        </p:spPr>
+        <p:style>
+          <a:lnRef idx="1">
+            <a:schemeClr val="accent1"/>
+          </a:lnRef>
+          <a:fillRef idx="0">
+            <a:schemeClr val="accent1"/>
+          </a:fillRef>
+          <a:effectRef idx="0">
+            <a:schemeClr val="accent1"/>
+          </a:effectRef>
+          <a:fontRef idx="minor">
+            <a:schemeClr val="tx1"/>
+          </a:fontRef>
+        </p:style>
+      </p:cxnSp>
+      <p:cxnSp>
+        <p:nvCxnSpPr>
+          <p:cNvPr id="10" name="Straight Arrow Connector 9">
+            <a:extLst>
+              <a:ext uri="{FF2B5EF4-FFF2-40B4-BE49-F238E27FC236}">
+                <a16:creationId xmlns:a16="http://schemas.microsoft.com/office/drawing/2014/main" id="{7C3ED340-A3C6-5C45-AF96-C18F2DFEA638}"/>
+              </a:ext>
+            </a:extLst>
+          </p:cNvPr>
+          <p:cNvCxnSpPr>
+            <a:cxnSpLocks/>
+          </p:cNvCxnSpPr>
+          <p:nvPr/>
+        </p:nvCxnSpPr>
+        <p:spPr>
+          <a:xfrm>
+            <a:off x="3667217" y="2866769"/>
+            <a:ext cx="0" cy="898042"/>
+          </a:xfrm>
+          <a:prstGeom prst="straightConnector1">
+            <a:avLst/>
+          </a:prstGeom>
+          <a:ln w="79375">
+            <a:solidFill>
+              <a:schemeClr val="bg1"/>
+            </a:solidFill>
+            <a:tailEnd type="triangle"/>
+          </a:ln>
+        </p:spPr>
+        <p:style>
+          <a:lnRef idx="1">
+            <a:schemeClr val="accent1"/>
+          </a:lnRef>
+          <a:fillRef idx="0">
+            <a:schemeClr val="accent1"/>
+          </a:fillRef>
+          <a:effectRef idx="0">
+            <a:schemeClr val="accent1"/>
+          </a:effectRef>
+          <a:fontRef idx="minor">
+            <a:schemeClr val="tx1"/>
+          </a:fontRef>
+        </p:style>
+      </p:cxnSp>
+      <p:cxnSp>
+        <p:nvCxnSpPr>
+          <p:cNvPr id="11" name="Straight Arrow Connector 10">
+            <a:extLst>
+              <a:ext uri="{FF2B5EF4-FFF2-40B4-BE49-F238E27FC236}">
+                <a16:creationId xmlns:a16="http://schemas.microsoft.com/office/drawing/2014/main" id="{EFA80F06-2E8D-A040-9B3C-B3CFE27CFC66}"/>
+              </a:ext>
+            </a:extLst>
+          </p:cNvPr>
+          <p:cNvCxnSpPr/>
+          <p:nvPr/>
+        </p:nvCxnSpPr>
+        <p:spPr>
+          <a:xfrm flipV="1">
+            <a:off x="6733146" y="4285129"/>
+            <a:ext cx="0" cy="1040633"/>
+          </a:xfrm>
+          <a:prstGeom prst="straightConnector1">
+            <a:avLst/>
+          </a:prstGeom>
+          <a:ln w="79375">
+            <a:solidFill>
+              <a:schemeClr val="bg1"/>
+            </a:solidFill>
+            <a:tailEnd type="triangle"/>
+          </a:ln>
+        </p:spPr>
+        <p:style>
+          <a:lnRef idx="1">
+            <a:schemeClr val="accent1"/>
+          </a:lnRef>
+          <a:fillRef idx="0">
+            <a:schemeClr val="accent1"/>
+          </a:fillRef>
+          <a:effectRef idx="0">
+            <a:schemeClr val="accent1"/>
+          </a:effectRef>
+          <a:fontRef idx="minor">
+            <a:schemeClr val="tx1"/>
+          </a:fontRef>
+        </p:style>
+      </p:cxnSp>
+      <p:sp>
+        <p:nvSpPr>
+          <p:cNvPr id="13" name="TextBox 12">
+            <a:extLst>
+              <a:ext uri="{FF2B5EF4-FFF2-40B4-BE49-F238E27FC236}">
+                <a16:creationId xmlns:a16="http://schemas.microsoft.com/office/drawing/2014/main" id="{2589F4D9-738D-934B-AC6A-E955E349B71C}"/>
+              </a:ext>
+            </a:extLst>
+          </p:cNvPr>
+          <p:cNvSpPr txBox="1"/>
+          <p:nvPr/>
+        </p:nvSpPr>
+        <p:spPr>
+          <a:xfrm>
+            <a:off x="1079498" y="1847996"/>
+            <a:ext cx="2369758" cy="523220"/>
+          </a:xfrm>
+          <a:prstGeom prst="rect">
+            <a:avLst/>
+          </a:prstGeom>
+          <a:noFill/>
+        </p:spPr>
+        <p:txBody>
+          <a:bodyPr wrap="square" rtlCol="0">
+            <a:spAutoFit/>
           </a:bodyPr>
           <a:lstStyle/>
           <a:p>
-            <a:r>
-              <a:rPr lang="en-US" sz="2400" dirty="0"/>
-              <a:t>Calculate correlated businesses</a:t>
-            </a:r>
-          </a:p>
-          <a:p>
-            <a:pPr lvl="1"/>
-            <a:r>
-              <a:rPr lang="en-US" sz="2000" dirty="0"/>
-              <a:t>User A voting on target business and business 1, 2, 3, 4, …</a:t>
-            </a:r>
-          </a:p>
-          <a:p>
-            <a:pPr marL="457200" lvl="1" indent="0">
-              <a:buNone/>
-            </a:pPr>
-            <a:endParaRPr lang="en-US" sz="2000" dirty="0"/>
-          </a:p>
-          <a:p>
-            <a:r>
-              <a:rPr lang="en-US" sz="2400" dirty="0"/>
-              <a:t>Have malicious users ”flip” (trap) the businesses in correlated set</a:t>
-            </a:r>
-          </a:p>
-          <a:p>
-            <a:pPr lvl="1"/>
-            <a:r>
-              <a:rPr lang="en-US" sz="2000" dirty="0"/>
-              <a:t>Increase malicious user’s trust</a:t>
-            </a:r>
-          </a:p>
-          <a:p>
-            <a:pPr lvl="1"/>
-            <a:r>
-              <a:rPr lang="en-US" sz="2000" dirty="0"/>
-              <a:t>Decrease honest user’s trust</a:t>
-            </a:r>
-          </a:p>
-          <a:p>
-            <a:pPr lvl="1"/>
-            <a:endParaRPr lang="en-US" sz="2000" dirty="0"/>
-          </a:p>
-          <a:p>
-            <a:r>
-              <a:rPr lang="en-US" sz="2400" dirty="0"/>
-              <a:t>Attack the uncorrelated set</a:t>
-            </a:r>
-          </a:p>
-          <a:p>
-            <a:endParaRPr lang="en-US" sz="2400" dirty="0"/>
-          </a:p>
-          <a:p>
-            <a:r>
-              <a:rPr lang="en-US" sz="2400" dirty="0"/>
-              <a:t>Vote honestly on uncorrelated, then on correlated</a:t>
+            <a:pPr algn="ctr"/>
+            <a:r>
+              <a:rPr lang="en-US" sz="2800" dirty="0" err="1"/>
+              <a:t>RepTrap</a:t>
+            </a:r>
+            <a:endParaRPr lang="en-US" dirty="0"/>
+          </a:p>
+        </p:txBody>
+      </p:sp>
+      <p:sp>
+        <p:nvSpPr>
+          <p:cNvPr id="15" name="TextBox 14">
+            <a:extLst>
+              <a:ext uri="{FF2B5EF4-FFF2-40B4-BE49-F238E27FC236}">
+                <a16:creationId xmlns:a16="http://schemas.microsoft.com/office/drawing/2014/main" id="{E3C4B826-C65B-BF48-AAFA-CC667C050B16}"/>
+              </a:ext>
+            </a:extLst>
+          </p:cNvPr>
+          <p:cNvSpPr txBox="1"/>
+          <p:nvPr/>
+        </p:nvSpPr>
+        <p:spPr>
+          <a:xfrm>
+            <a:off x="6712967" y="1896260"/>
+            <a:ext cx="2672244" cy="523220"/>
+          </a:xfrm>
+          <a:prstGeom prst="rect">
+            <a:avLst/>
+          </a:prstGeom>
+          <a:noFill/>
+        </p:spPr>
+        <p:txBody>
+          <a:bodyPr wrap="square" rtlCol="0">
+            <a:spAutoFit/>
+          </a:bodyPr>
+          <a:lstStyle/>
+          <a:p>
+            <a:pPr algn="ctr"/>
+            <a:r>
+              <a:rPr lang="en-US" sz="2800" dirty="0"/>
+              <a:t>Honest</a:t>
+            </a:r>
+            <a:r>
+              <a:rPr lang="en-US" dirty="0"/>
+              <a:t> </a:t>
+            </a:r>
+            <a:r>
+              <a:rPr lang="en-US" sz="2800" dirty="0"/>
+              <a:t>Voting</a:t>
+            </a:r>
+            <a:endParaRPr lang="en-US" dirty="0"/>
+          </a:p>
+        </p:txBody>
+      </p:sp>
+      <p:sp>
+        <p:nvSpPr>
+          <p:cNvPr id="16" name="TextBox 15">
+            <a:extLst>
+              <a:ext uri="{FF2B5EF4-FFF2-40B4-BE49-F238E27FC236}">
+                <a16:creationId xmlns:a16="http://schemas.microsoft.com/office/drawing/2014/main" id="{3C5FCF3A-171B-1342-A4E6-58A3FE8A3BF3}"/>
+              </a:ext>
+            </a:extLst>
+          </p:cNvPr>
+          <p:cNvSpPr txBox="1"/>
+          <p:nvPr/>
+        </p:nvSpPr>
+        <p:spPr>
+          <a:xfrm>
+            <a:off x="1143087" y="6144585"/>
+            <a:ext cx="2369758" cy="369332"/>
+          </a:xfrm>
+          <a:prstGeom prst="rect">
+            <a:avLst/>
+          </a:prstGeom>
+          <a:noFill/>
+        </p:spPr>
+        <p:txBody>
+          <a:bodyPr wrap="square" rtlCol="0">
+            <a:spAutoFit/>
+          </a:bodyPr>
+          <a:lstStyle/>
+          <a:p>
+            <a:pPr algn="ctr"/>
+            <a:r>
+              <a:rPr lang="en-US" dirty="0"/>
+              <a:t>User Trust</a:t>
+            </a:r>
+          </a:p>
+        </p:txBody>
+      </p:sp>
+      <p:sp>
+        <p:nvSpPr>
+          <p:cNvPr id="17" name="TextBox 16">
+            <a:extLst>
+              <a:ext uri="{FF2B5EF4-FFF2-40B4-BE49-F238E27FC236}">
+                <a16:creationId xmlns:a16="http://schemas.microsoft.com/office/drawing/2014/main" id="{4F35A52C-9331-D548-B304-0AFF94DEE90E}"/>
+              </a:ext>
+            </a:extLst>
+          </p:cNvPr>
+          <p:cNvSpPr txBox="1"/>
+          <p:nvPr/>
+        </p:nvSpPr>
+        <p:spPr>
+          <a:xfrm>
+            <a:off x="7015453" y="6144585"/>
+            <a:ext cx="2369758" cy="369332"/>
+          </a:xfrm>
+          <a:prstGeom prst="rect">
+            <a:avLst/>
+          </a:prstGeom>
+          <a:noFill/>
+        </p:spPr>
+        <p:txBody>
+          <a:bodyPr wrap="square" rtlCol="0">
+            <a:spAutoFit/>
+          </a:bodyPr>
+          <a:lstStyle/>
+          <a:p>
+            <a:pPr algn="ctr"/>
+            <a:r>
+              <a:rPr lang="en-US" dirty="0"/>
+              <a:t>User Trust</a:t>
+            </a:r>
+          </a:p>
+        </p:txBody>
+      </p:sp>
+      <p:sp>
+        <p:nvSpPr>
+          <p:cNvPr id="18" name="TextBox 17">
+            <a:extLst>
+              <a:ext uri="{FF2B5EF4-FFF2-40B4-BE49-F238E27FC236}">
+                <a16:creationId xmlns:a16="http://schemas.microsoft.com/office/drawing/2014/main" id="{49572C67-216F-C444-BD77-AAAEA4E7E662}"/>
+              </a:ext>
+            </a:extLst>
+          </p:cNvPr>
+          <p:cNvSpPr txBox="1"/>
+          <p:nvPr/>
+        </p:nvSpPr>
+        <p:spPr>
+          <a:xfrm>
+            <a:off x="6882526" y="5606659"/>
+            <a:ext cx="1317806" cy="369332"/>
+          </a:xfrm>
+          <a:prstGeom prst="rect">
+            <a:avLst/>
+          </a:prstGeom>
+          <a:noFill/>
+        </p:spPr>
+        <p:txBody>
+          <a:bodyPr wrap="square" rtlCol="0">
+            <a:spAutoFit/>
+          </a:bodyPr>
+          <a:lstStyle/>
+          <a:p>
+            <a:pPr algn="ctr"/>
+            <a:r>
+              <a:rPr lang="en-US" dirty="0"/>
+              <a:t>Bad</a:t>
+            </a:r>
+          </a:p>
+        </p:txBody>
+      </p:sp>
+      <p:sp>
+        <p:nvSpPr>
+          <p:cNvPr id="19" name="TextBox 18">
+            <a:extLst>
+              <a:ext uri="{FF2B5EF4-FFF2-40B4-BE49-F238E27FC236}">
+                <a16:creationId xmlns:a16="http://schemas.microsoft.com/office/drawing/2014/main" id="{50E07395-66B0-9E4D-85F8-34E6C8AC28A9}"/>
+              </a:ext>
+            </a:extLst>
+          </p:cNvPr>
+          <p:cNvSpPr txBox="1"/>
+          <p:nvPr/>
+        </p:nvSpPr>
+        <p:spPr>
+          <a:xfrm>
+            <a:off x="7967737" y="5596626"/>
+            <a:ext cx="1317806" cy="369332"/>
+          </a:xfrm>
+          <a:prstGeom prst="rect">
+            <a:avLst/>
+          </a:prstGeom>
+          <a:noFill/>
+        </p:spPr>
+        <p:txBody>
+          <a:bodyPr wrap="square" rtlCol="0">
+            <a:spAutoFit/>
+          </a:bodyPr>
+          <a:lstStyle/>
+          <a:p>
+            <a:pPr algn="ctr"/>
+            <a:r>
+              <a:rPr lang="en-US" dirty="0"/>
+              <a:t>Good</a:t>
+            </a:r>
+          </a:p>
+        </p:txBody>
+      </p:sp>
+      <p:sp>
+        <p:nvSpPr>
+          <p:cNvPr id="20" name="TextBox 19">
+            <a:extLst>
+              <a:ext uri="{FF2B5EF4-FFF2-40B4-BE49-F238E27FC236}">
+                <a16:creationId xmlns:a16="http://schemas.microsoft.com/office/drawing/2014/main" id="{DD9D525B-E9AA-E540-8682-CFE16361E4F6}"/>
+              </a:ext>
+            </a:extLst>
+          </p:cNvPr>
+          <p:cNvSpPr txBox="1"/>
+          <p:nvPr/>
+        </p:nvSpPr>
+        <p:spPr>
+          <a:xfrm>
+            <a:off x="1046239" y="5606659"/>
+            <a:ext cx="1317806" cy="369332"/>
+          </a:xfrm>
+          <a:prstGeom prst="rect">
+            <a:avLst/>
+          </a:prstGeom>
+          <a:noFill/>
+        </p:spPr>
+        <p:txBody>
+          <a:bodyPr wrap="square" rtlCol="0">
+            <a:spAutoFit/>
+          </a:bodyPr>
+          <a:lstStyle/>
+          <a:p>
+            <a:pPr algn="ctr"/>
+            <a:r>
+              <a:rPr lang="en-US" dirty="0"/>
+              <a:t>Bad</a:t>
+            </a:r>
+          </a:p>
+        </p:txBody>
+      </p:sp>
+      <p:sp>
+        <p:nvSpPr>
+          <p:cNvPr id="21" name="TextBox 20">
+            <a:extLst>
+              <a:ext uri="{FF2B5EF4-FFF2-40B4-BE49-F238E27FC236}">
+                <a16:creationId xmlns:a16="http://schemas.microsoft.com/office/drawing/2014/main" id="{90AB4EE1-2FD4-C247-9BD6-010599A5EC65}"/>
+              </a:ext>
+            </a:extLst>
+          </p:cNvPr>
+          <p:cNvSpPr txBox="1"/>
+          <p:nvPr/>
+        </p:nvSpPr>
+        <p:spPr>
+          <a:xfrm>
+            <a:off x="2131450" y="5596626"/>
+            <a:ext cx="1317806" cy="369332"/>
+          </a:xfrm>
+          <a:prstGeom prst="rect">
+            <a:avLst/>
+          </a:prstGeom>
+          <a:noFill/>
+        </p:spPr>
+        <p:txBody>
+          <a:bodyPr wrap="square" rtlCol="0">
+            <a:spAutoFit/>
+          </a:bodyPr>
+          <a:lstStyle/>
+          <a:p>
+            <a:pPr algn="ctr"/>
+            <a:r>
+              <a:rPr lang="en-US" dirty="0"/>
+              <a:t>Good</a:t>
             </a:r>
           </a:p>
         </p:txBody>
@@ -9082,7 +9876,7 @@
     </p:spTree>
     <p:extLst>
       <p:ext uri="{BB962C8B-B14F-4D97-AF65-F5344CB8AC3E}">
-        <p14:creationId xmlns:p14="http://schemas.microsoft.com/office/powerpoint/2010/main" val="3601842057"/>
+        <p14:creationId xmlns:p14="http://schemas.microsoft.com/office/powerpoint/2010/main" val="3026547910"/>
       </p:ext>
     </p:extLst>
   </p:cSld>
@@ -9114,7 +9908,7 @@
           <p:cNvPr id="2" name="Title 1">
             <a:extLst>
               <a:ext uri="{FF2B5EF4-FFF2-40B4-BE49-F238E27FC236}">
-                <a16:creationId xmlns:a16="http://schemas.microsoft.com/office/drawing/2014/main" id="{7ECDC5A2-26E9-9542-9B18-0964841A1700}"/>
+                <a16:creationId xmlns:a16="http://schemas.microsoft.com/office/drawing/2014/main" id="{63D9B066-9C23-9C4A-BFD7-B4808FD33515}"/>
               </a:ext>
             </a:extLst>
           </p:cNvPr>
@@ -9134,10 +9928,7 @@
               <a:rPr lang="en-US" dirty="0" err="1"/>
               <a:t>RepTrap</a:t>
             </a:r>
-            <a:r>
-              <a:rPr lang="en-US" dirty="0"/>
-              <a:t> Optimization</a:t>
-            </a:r>
+            <a:endParaRPr lang="en-US" dirty="0"/>
           </a:p>
         </p:txBody>
       </p:sp>
@@ -9146,7 +9937,7 @@
           <p:cNvPr id="3" name="Content Placeholder 2">
             <a:extLst>
               <a:ext uri="{FF2B5EF4-FFF2-40B4-BE49-F238E27FC236}">
-                <a16:creationId xmlns:a16="http://schemas.microsoft.com/office/drawing/2014/main" id="{0C2CD1E3-FB0D-1C46-8E5D-772B150BCC8F}"/>
+                <a16:creationId xmlns:a16="http://schemas.microsoft.com/office/drawing/2014/main" id="{9C1A04B2-7343-4043-B1C5-10A1A9FECB1E}"/>
               </a:ext>
             </a:extLst>
           </p:cNvPr>
@@ -9160,31 +9951,65 @@
         <p:spPr/>
         <p:txBody>
           <a:bodyPr>
-            <a:normAutofit/>
+            <a:normAutofit fontScale="92500" lnSpcReduction="20000"/>
           </a:bodyPr>
           <a:lstStyle/>
           <a:p>
             <a:r>
-              <a:rPr lang="en-US" sz="2800" dirty="0"/>
-              <a:t>Calculate theoretical number of honest votes</a:t>
-            </a:r>
-          </a:p>
-          <a:p>
-            <a:endParaRPr lang="en-US" sz="2800" dirty="0"/>
-          </a:p>
-          <a:p>
-            <a:r>
-              <a:rPr lang="en-US" sz="2800" dirty="0"/>
-              <a:t>Skip business trapping if honest votes are less</a:t>
-            </a:r>
-          </a:p>
-          <a:p>
-            <a:endParaRPr lang="en-US" sz="2800" dirty="0"/>
-          </a:p>
-          <a:p>
-            <a:r>
-              <a:rPr lang="en-US" sz="2800" dirty="0"/>
-              <a:t>Can save votes on the final stage of voting</a:t>
+              <a:rPr lang="en-US" sz="2400" dirty="0"/>
+              <a:t>Calculate correlated businesses</a:t>
+            </a:r>
+          </a:p>
+          <a:p>
+            <a:pPr lvl="1"/>
+            <a:r>
+              <a:rPr lang="en-US" sz="2000" dirty="0"/>
+              <a:t>User A voting on target business and business 1, 2, 3, 4, …</a:t>
+            </a:r>
+          </a:p>
+          <a:p>
+            <a:pPr marL="457200" lvl="1" indent="0">
+              <a:buNone/>
+            </a:pPr>
+            <a:endParaRPr lang="en-US" sz="2000" dirty="0"/>
+          </a:p>
+          <a:p>
+            <a:r>
+              <a:rPr lang="en-US" sz="2400" dirty="0"/>
+              <a:t>Have malicious users ”flip” (trap) the businesses in correlated set</a:t>
+            </a:r>
+          </a:p>
+          <a:p>
+            <a:pPr lvl="1"/>
+            <a:r>
+              <a:rPr lang="en-US" sz="2000" dirty="0"/>
+              <a:t>Increase malicious user’s trust</a:t>
+            </a:r>
+          </a:p>
+          <a:p>
+            <a:pPr lvl="1"/>
+            <a:r>
+              <a:rPr lang="en-US" sz="2000" dirty="0"/>
+              <a:t>Decrease honest user’s trust</a:t>
+            </a:r>
+          </a:p>
+          <a:p>
+            <a:pPr lvl="1"/>
+            <a:endParaRPr lang="en-US" sz="2000" dirty="0"/>
+          </a:p>
+          <a:p>
+            <a:r>
+              <a:rPr lang="en-US" sz="2400" dirty="0"/>
+              <a:t>Attack the uncorrelated set</a:t>
+            </a:r>
+          </a:p>
+          <a:p>
+            <a:endParaRPr lang="en-US" sz="2400" dirty="0"/>
+          </a:p>
+          <a:p>
+            <a:r>
+              <a:rPr lang="en-US" sz="2400" dirty="0"/>
+              <a:t>Vote honestly on uncorrelated, then on correlated</a:t>
             </a:r>
           </a:p>
         </p:txBody>
@@ -9192,7 +10017,7 @@
     </p:spTree>
     <p:extLst>
       <p:ext uri="{BB962C8B-B14F-4D97-AF65-F5344CB8AC3E}">
-        <p14:creationId xmlns:p14="http://schemas.microsoft.com/office/powerpoint/2010/main" val="3743176848"/>
+        <p14:creationId xmlns:p14="http://schemas.microsoft.com/office/powerpoint/2010/main" val="3601842057"/>
       </p:ext>
     </p:extLst>
   </p:cSld>
@@ -9224,7 +10049,7 @@
           <p:cNvPr id="2" name="Title 1">
             <a:extLst>
               <a:ext uri="{FF2B5EF4-FFF2-40B4-BE49-F238E27FC236}">
-                <a16:creationId xmlns:a16="http://schemas.microsoft.com/office/drawing/2014/main" id="{E491E966-09A7-C743-9565-E661EAAD2CA5}"/>
+                <a16:creationId xmlns:a16="http://schemas.microsoft.com/office/drawing/2014/main" id="{7ECDC5A2-26E9-9542-9B18-0964841A1700}"/>
               </a:ext>
             </a:extLst>
           </p:cNvPr>
@@ -9241,8 +10066,12 @@
           <a:lstStyle/>
           <a:p>
             <a:r>
+              <a:rPr lang="en-US" dirty="0" err="1"/>
+              <a:t>RepTrap</a:t>
+            </a:r>
+            <a:r>
               <a:rPr lang="en-US" dirty="0"/>
-              <a:t>Data</a:t>
+              <a:t> Optimization</a:t>
             </a:r>
           </a:p>
         </p:txBody>
@@ -9252,7 +10081,7 @@
           <p:cNvPr id="3" name="Content Placeholder 2">
             <a:extLst>
               <a:ext uri="{FF2B5EF4-FFF2-40B4-BE49-F238E27FC236}">
-                <a16:creationId xmlns:a16="http://schemas.microsoft.com/office/drawing/2014/main" id="{B05F0341-7896-D142-B9BF-B1D76D71C405}"/>
+                <a16:creationId xmlns:a16="http://schemas.microsoft.com/office/drawing/2014/main" id="{0C2CD1E3-FB0D-1C46-8E5D-772B150BCC8F}"/>
               </a:ext>
             </a:extLst>
           </p:cNvPr>
@@ -9266,78 +10095,39 @@
         <p:spPr/>
         <p:txBody>
           <a:bodyPr>
-            <a:normAutofit fontScale="92500" lnSpcReduction="10000"/>
+            <a:normAutofit/>
           </a:bodyPr>
           <a:lstStyle/>
           <a:p>
             <a:r>
-              <a:rPr lang="en-US" sz="2400" dirty="0"/>
-              <a:t>Public Yelp Dataset</a:t>
-            </a:r>
-          </a:p>
-          <a:p>
-            <a:pPr lvl="1"/>
-            <a:r>
-              <a:rPr lang="en-US" sz="2000" dirty="0"/>
-              <a:t>Contains over 6,000,000 reviews</a:t>
-            </a:r>
-          </a:p>
-          <a:p>
-            <a:pPr lvl="1"/>
-            <a:r>
-              <a:rPr lang="en-US" sz="2000" dirty="0"/>
-              <a:t>Contains nearly 200,000 businesses</a:t>
-            </a:r>
-          </a:p>
-          <a:p>
-            <a:pPr lvl="1"/>
-            <a:endParaRPr lang="en-US" sz="2000" dirty="0"/>
-          </a:p>
-          <a:p>
-            <a:r>
-              <a:rPr lang="en-US" sz="2400" dirty="0"/>
-              <a:t>Allows </a:t>
-            </a:r>
-            <a:r>
-              <a:rPr lang="en-US" sz="2400" dirty="0" err="1"/>
-              <a:t>RepTrap</a:t>
-            </a:r>
-            <a:r>
-              <a:rPr lang="en-US" sz="2400" dirty="0"/>
-              <a:t> and user trust to be tested on real data</a:t>
-            </a:r>
-          </a:p>
-          <a:p>
-            <a:endParaRPr lang="en-US" sz="2400" dirty="0"/>
-          </a:p>
-          <a:p>
-            <a:r>
-              <a:rPr lang="en-US" sz="2400" dirty="0"/>
-              <a:t>Data is spread over many businesses</a:t>
-            </a:r>
-          </a:p>
-          <a:p>
-            <a:endParaRPr lang="en-US" sz="2400" dirty="0"/>
-          </a:p>
-          <a:p>
-            <a:r>
-              <a:rPr lang="en-US" sz="2400" dirty="0"/>
-              <a:t>Tests are re-producible with the same dataset for comparing to other strategies</a:t>
-            </a:r>
-          </a:p>
-          <a:p>
-            <a:endParaRPr lang="en-US" dirty="0"/>
-          </a:p>
-          <a:p>
-            <a:pPr lvl="1"/>
-            <a:endParaRPr lang="en-US" dirty="0"/>
+              <a:rPr lang="en-US" sz="2800" dirty="0"/>
+              <a:t>Calculate theoretical number of honest votes</a:t>
+            </a:r>
+          </a:p>
+          <a:p>
+            <a:endParaRPr lang="en-US" sz="2800" dirty="0"/>
+          </a:p>
+          <a:p>
+            <a:r>
+              <a:rPr lang="en-US" sz="2800" dirty="0"/>
+              <a:t>Skip business trapping if honest votes are less</a:t>
+            </a:r>
+          </a:p>
+          <a:p>
+            <a:endParaRPr lang="en-US" sz="2800" dirty="0"/>
+          </a:p>
+          <a:p>
+            <a:r>
+              <a:rPr lang="en-US" sz="2800" dirty="0"/>
+              <a:t>Can save votes on the final stage of voting</a:t>
+            </a:r>
           </a:p>
         </p:txBody>
       </p:sp>
     </p:spTree>
     <p:extLst>
       <p:ext uri="{BB962C8B-B14F-4D97-AF65-F5344CB8AC3E}">
-        <p14:creationId xmlns:p14="http://schemas.microsoft.com/office/powerpoint/2010/main" val="2815643756"/>
+        <p14:creationId xmlns:p14="http://schemas.microsoft.com/office/powerpoint/2010/main" val="3743176848"/>
       </p:ext>
     </p:extLst>
   </p:cSld>
@@ -9369,7 +10159,7 @@
           <p:cNvPr id="2" name="Title 1">
             <a:extLst>
               <a:ext uri="{FF2B5EF4-FFF2-40B4-BE49-F238E27FC236}">
-                <a16:creationId xmlns:a16="http://schemas.microsoft.com/office/drawing/2014/main" id="{167BE002-6A35-4745-85DE-DC34DCD12804}"/>
+                <a16:creationId xmlns:a16="http://schemas.microsoft.com/office/drawing/2014/main" id="{E491E966-09A7-C743-9565-E661EAAD2CA5}"/>
               </a:ext>
             </a:extLst>
           </p:cNvPr>
@@ -9387,7 +10177,7 @@
           <a:p>
             <a:r>
               <a:rPr lang="en-US" dirty="0"/>
-              <a:t>Results from simulation</a:t>
+              <a:t>Data</a:t>
             </a:r>
           </a:p>
         </p:txBody>
@@ -9397,7 +10187,7 @@
           <p:cNvPr id="3" name="Content Placeholder 2">
             <a:extLst>
               <a:ext uri="{FF2B5EF4-FFF2-40B4-BE49-F238E27FC236}">
-                <a16:creationId xmlns:a16="http://schemas.microsoft.com/office/drawing/2014/main" id="{ADC8CA73-91EE-974F-93CE-021B30B6A4CE}"/>
+                <a16:creationId xmlns:a16="http://schemas.microsoft.com/office/drawing/2014/main" id="{B05F0341-7896-D142-B9BF-B1D76D71C405}"/>
               </a:ext>
             </a:extLst>
           </p:cNvPr>
@@ -9411,20 +10201,27 @@
         <p:spPr/>
         <p:txBody>
           <a:bodyPr>
-            <a:normAutofit lnSpcReduction="10000"/>
+            <a:normAutofit fontScale="92500" lnSpcReduction="10000"/>
           </a:bodyPr>
           <a:lstStyle/>
           <a:p>
             <a:r>
               <a:rPr lang="en-US" sz="2400" dirty="0"/>
-              <a:t>Number of Malicious users increases</a:t>
+              <a:t>Public Yelp Dataset</a:t>
             </a:r>
           </a:p>
           <a:p>
             <a:pPr lvl="1"/>
             <a:r>
               <a:rPr lang="en-US" sz="2000" dirty="0"/>
-              <a:t>Decrease total malicious votes</a:t>
+              <a:t>Contains over 6,000,000 reviews</a:t>
+            </a:r>
+          </a:p>
+          <a:p>
+            <a:pPr lvl="1"/>
+            <a:r>
+              <a:rPr lang="en-US" sz="2000" dirty="0"/>
+              <a:t>Contains nearly 200,000 businesses</a:t>
             </a:r>
           </a:p>
           <a:p>
@@ -9433,12 +10230,16 @@
           </a:p>
           <a:p>
             <a:r>
+              <a:rPr lang="en-US" sz="2400" dirty="0"/>
+              <a:t>Allows </a:t>
+            </a:r>
+            <a:r>
               <a:rPr lang="en-US" sz="2400" dirty="0" err="1"/>
               <a:t>RepTrap</a:t>
             </a:r>
             <a:r>
               <a:rPr lang="en-US" sz="2400" dirty="0"/>
-              <a:t> was able to trap target business with nearly %25 fewer resources</a:t>
+              <a:t> and user trust to be tested on real data</a:t>
             </a:r>
           </a:p>
           <a:p>
@@ -9446,40 +10247,24 @@
           </a:p>
           <a:p>
             <a:r>
-              <a:rPr lang="en-US" sz="2400" dirty="0" err="1"/>
-              <a:t>RepTrap</a:t>
-            </a:r>
-            <a:r>
               <a:rPr lang="en-US" sz="2400" dirty="0"/>
-              <a:t> is also able to succeed when Honest voting fails</a:t>
-            </a:r>
+              <a:t>Data is spread over many businesses</a:t>
+            </a:r>
+          </a:p>
+          <a:p>
+            <a:endParaRPr lang="en-US" sz="2400" dirty="0"/>
+          </a:p>
+          <a:p>
+            <a:r>
+              <a:rPr lang="en-US" sz="2400" dirty="0"/>
+              <a:t>Tests are re-producible with the same dataset for comparing to other strategies</a:t>
+            </a:r>
+          </a:p>
+          <a:p>
+            <a:endParaRPr lang="en-US" dirty="0"/>
           </a:p>
           <a:p>
             <a:pPr lvl="1"/>
-            <a:r>
-              <a:rPr lang="en-US" sz="2000" dirty="0"/>
-              <a:t>Trap top %10 business</a:t>
-            </a:r>
-          </a:p>
-          <a:p>
-            <a:pPr lvl="2"/>
-            <a:r>
-              <a:rPr lang="en-US" sz="1800" dirty="0"/>
-              <a:t>Honest voting = 41 malicious users</a:t>
-            </a:r>
-          </a:p>
-          <a:p>
-            <a:pPr lvl="2"/>
-            <a:r>
-              <a:rPr lang="en-US" sz="1800" dirty="0" err="1"/>
-              <a:t>RepTrap</a:t>
-            </a:r>
-            <a:r>
-              <a:rPr lang="en-US" sz="1800" dirty="0"/>
-              <a:t> voting = 34 malicious users</a:t>
-            </a:r>
-          </a:p>
-          <a:p>
             <a:endParaRPr lang="en-US" dirty="0"/>
           </a:p>
         </p:txBody>
@@ -9487,7 +10272,7 @@
     </p:spTree>
     <p:extLst>
       <p:ext uri="{BB962C8B-B14F-4D97-AF65-F5344CB8AC3E}">
-        <p14:creationId xmlns:p14="http://schemas.microsoft.com/office/powerpoint/2010/main" val="3721746824"/>
+        <p14:creationId xmlns:p14="http://schemas.microsoft.com/office/powerpoint/2010/main" val="2815643756"/>
       </p:ext>
     </p:extLst>
   </p:cSld>
@@ -9519,7 +10304,7 @@
           <p:cNvPr id="2" name="Title 1">
             <a:extLst>
               <a:ext uri="{FF2B5EF4-FFF2-40B4-BE49-F238E27FC236}">
-                <a16:creationId xmlns:a16="http://schemas.microsoft.com/office/drawing/2014/main" id="{7D4DC21B-6A3C-7442-ACC2-588D5D15677B}"/>
+                <a16:creationId xmlns:a16="http://schemas.microsoft.com/office/drawing/2014/main" id="{167BE002-6A35-4745-85DE-DC34DCD12804}"/>
               </a:ext>
             </a:extLst>
           </p:cNvPr>
@@ -9537,46 +10322,107 @@
           <a:p>
             <a:r>
               <a:rPr lang="en-US" dirty="0"/>
-              <a:t>Simulation on top %10 business</a:t>
-            </a:r>
-          </a:p>
-        </p:txBody>
-      </p:sp>
-      <p:graphicFrame>
-        <p:nvGraphicFramePr>
-          <p:cNvPr id="6" name="Content Placeholder 5">
+              <a:t>Results from simulation</a:t>
+            </a:r>
+          </a:p>
+        </p:txBody>
+      </p:sp>
+      <p:sp>
+        <p:nvSpPr>
+          <p:cNvPr id="3" name="Content Placeholder 2">
             <a:extLst>
               <a:ext uri="{FF2B5EF4-FFF2-40B4-BE49-F238E27FC236}">
-                <a16:creationId xmlns:a16="http://schemas.microsoft.com/office/drawing/2014/main" id="{BD467D05-DA3D-437A-B9CF-62CC82AF7EE3}"/>
+                <a16:creationId xmlns:a16="http://schemas.microsoft.com/office/drawing/2014/main" id="{ADC8CA73-91EE-974F-93CE-021B30B6A4CE}"/>
               </a:ext>
             </a:extLst>
           </p:cNvPr>
-          <p:cNvGraphicFramePr>
-            <a:graphicFrameLocks noGrp="1"/>
-          </p:cNvGraphicFramePr>
+          <p:cNvSpPr>
+            <a:spLocks noGrp="1"/>
+          </p:cNvSpPr>
           <p:nvPr>
             <p:ph idx="1"/>
-            <p:extLst>
-              <p:ext uri="{D42A27DB-BD31-4B8C-83A1-F6EECF244321}">
-                <p14:modId xmlns:p14="http://schemas.microsoft.com/office/powerpoint/2010/main" val="1810765744"/>
-              </p:ext>
-            </p:extLst>
-          </p:nvPr>
-        </p:nvGraphicFramePr>
-        <p:xfrm>
-          <a:off x="645740" y="1853248"/>
-          <a:ext cx="9404723" cy="4395152"/>
-        </p:xfrm>
-        <a:graphic>
-          <a:graphicData uri="http://schemas.openxmlformats.org/drawingml/2006/chart">
-            <c:chart xmlns:c="http://schemas.openxmlformats.org/drawingml/2006/chart" xmlns:r="http://schemas.openxmlformats.org/officeDocument/2006/relationships" r:id="rId2"/>
-          </a:graphicData>
-        </a:graphic>
-      </p:graphicFrame>
+          </p:nvPr>
+        </p:nvSpPr>
+        <p:spPr/>
+        <p:txBody>
+          <a:bodyPr>
+            <a:normAutofit lnSpcReduction="10000"/>
+          </a:bodyPr>
+          <a:lstStyle/>
+          <a:p>
+            <a:r>
+              <a:rPr lang="en-US" sz="2400" dirty="0"/>
+              <a:t>Number of Malicious users increases</a:t>
+            </a:r>
+          </a:p>
+          <a:p>
+            <a:pPr lvl="1"/>
+            <a:r>
+              <a:rPr lang="en-US" sz="2000" dirty="0"/>
+              <a:t>Decrease total malicious votes</a:t>
+            </a:r>
+          </a:p>
+          <a:p>
+            <a:pPr lvl="1"/>
+            <a:endParaRPr lang="en-US" sz="2000" dirty="0"/>
+          </a:p>
+          <a:p>
+            <a:r>
+              <a:rPr lang="en-US" sz="2400" dirty="0" err="1"/>
+              <a:t>RepTrap</a:t>
+            </a:r>
+            <a:r>
+              <a:rPr lang="en-US" sz="2400" dirty="0"/>
+              <a:t> was able to trap target business with nearly %25 fewer resources</a:t>
+            </a:r>
+          </a:p>
+          <a:p>
+            <a:endParaRPr lang="en-US" sz="2400" dirty="0"/>
+          </a:p>
+          <a:p>
+            <a:r>
+              <a:rPr lang="en-US" sz="2400" dirty="0" err="1"/>
+              <a:t>RepTrap</a:t>
+            </a:r>
+            <a:r>
+              <a:rPr lang="en-US" sz="2400" dirty="0"/>
+              <a:t> is also able to succeed when Honest voting fails</a:t>
+            </a:r>
+          </a:p>
+          <a:p>
+            <a:pPr lvl="1"/>
+            <a:r>
+              <a:rPr lang="en-US" sz="2000" dirty="0"/>
+              <a:t>Trap top %10 business</a:t>
+            </a:r>
+          </a:p>
+          <a:p>
+            <a:pPr lvl="2"/>
+            <a:r>
+              <a:rPr lang="en-US" sz="1800" dirty="0"/>
+              <a:t>Honest voting = 41 malicious users</a:t>
+            </a:r>
+          </a:p>
+          <a:p>
+            <a:pPr lvl="2"/>
+            <a:r>
+              <a:rPr lang="en-US" sz="1800" dirty="0" err="1"/>
+              <a:t>RepTrap</a:t>
+            </a:r>
+            <a:r>
+              <a:rPr lang="en-US" sz="1800" dirty="0"/>
+              <a:t> voting = 34 malicious users</a:t>
+            </a:r>
+          </a:p>
+          <a:p>
+            <a:endParaRPr lang="en-US" dirty="0"/>
+          </a:p>
+        </p:txBody>
+      </p:sp>
     </p:spTree>
     <p:extLst>
       <p:ext uri="{BB962C8B-B14F-4D97-AF65-F5344CB8AC3E}">
-        <p14:creationId xmlns:p14="http://schemas.microsoft.com/office/powerpoint/2010/main" val="282926341"/>
+        <p14:creationId xmlns:p14="http://schemas.microsoft.com/office/powerpoint/2010/main" val="3721746824"/>
       </p:ext>
     </p:extLst>
   </p:cSld>
@@ -9626,17 +10472,17 @@
           <a:p>
             <a:r>
               <a:rPr lang="en-US" dirty="0"/>
-              <a:t>Simulation on top %1.6 business</a:t>
+              <a:t>Simulation on top %10 business</a:t>
             </a:r>
           </a:p>
         </p:txBody>
       </p:sp>
       <p:graphicFrame>
         <p:nvGraphicFramePr>
-          <p:cNvPr id="10" name="Content Placeholder 9">
+          <p:cNvPr id="6" name="Content Placeholder 5">
             <a:extLst>
               <a:ext uri="{FF2B5EF4-FFF2-40B4-BE49-F238E27FC236}">
-                <a16:creationId xmlns:a16="http://schemas.microsoft.com/office/drawing/2014/main" id="{1D46E59F-E1CD-4095-93E7-522D18CC97A1}"/>
+                <a16:creationId xmlns:a16="http://schemas.microsoft.com/office/drawing/2014/main" id="{BD467D05-DA3D-437A-B9CF-62CC82AF7EE3}"/>
               </a:ext>
             </a:extLst>
           </p:cNvPr>
@@ -9647,7 +10493,7 @@
             <p:ph idx="1"/>
             <p:extLst>
               <p:ext uri="{D42A27DB-BD31-4B8C-83A1-F6EECF244321}">
-                <p14:modId xmlns:p14="http://schemas.microsoft.com/office/powerpoint/2010/main" val="1539996356"/>
+                <p14:modId xmlns:p14="http://schemas.microsoft.com/office/powerpoint/2010/main" val="1810765744"/>
               </p:ext>
             </p:extLst>
           </p:nvPr>
@@ -9665,7 +10511,7 @@
     </p:spTree>
     <p:extLst>
       <p:ext uri="{BB962C8B-B14F-4D97-AF65-F5344CB8AC3E}">
-        <p14:creationId xmlns:p14="http://schemas.microsoft.com/office/powerpoint/2010/main" val="58319026"/>
+        <p14:creationId xmlns:p14="http://schemas.microsoft.com/office/powerpoint/2010/main" val="282926341"/>
       </p:ext>
     </p:extLst>
   </p:cSld>

</xml_diff>